<commit_message>
code folder for ML/DL codes
</commit_message>
<xml_diff>
--- a/ML_DL/DeepLearning/figures/AttentionMechanism.pptx
+++ b/ML_DL/DeepLearning/figures/AttentionMechanism.pptx
@@ -6,6 +6,7 @@
   </p:sldMasterIdLst>
   <p:sldIdLst>
     <p:sldId id="257" r:id="rId2"/>
+    <p:sldId id="259" r:id="rId3"/>
   </p:sldIdLst>
   <p:sldSz cx="12192000" cy="6858000"/>
   <p:notesSz cx="6858000" cy="9144000"/>
@@ -3365,8 +3366,8 @@
           </a:p>
         </p:txBody>
       </p:sp>
-      <mc:AlternateContent xmlns:mc="http://schemas.openxmlformats.org/markup-compatibility/2006">
-        <mc:Choice xmlns:a14="http://schemas.microsoft.com/office/drawing/2010/main" Requires="a14">
+      <mc:AlternateContent xmlns:mc="http://schemas.openxmlformats.org/markup-compatibility/2006" xmlns:a14="http://schemas.microsoft.com/office/drawing/2010/main">
+        <mc:Choice Requires="a14">
           <p:sp>
             <p:nvSpPr>
               <p:cNvPr id="69" name="TextBox 68">
@@ -3611,7 +3612,7 @@
             </p:txBody>
           </p:sp>
         </mc:Choice>
-        <mc:Fallback>
+        <mc:Fallback xmlns="">
           <p:sp>
             <p:nvSpPr>
               <p:cNvPr id="69" name="TextBox 68">
@@ -3656,8 +3657,8 @@
           </p:sp>
         </mc:Fallback>
       </mc:AlternateContent>
-      <mc:AlternateContent xmlns:mc="http://schemas.openxmlformats.org/markup-compatibility/2006">
-        <mc:Choice xmlns:a14="http://schemas.microsoft.com/office/drawing/2010/main" Requires="a14">
+      <mc:AlternateContent xmlns:mc="http://schemas.openxmlformats.org/markup-compatibility/2006" xmlns:a14="http://schemas.microsoft.com/office/drawing/2010/main">
+        <mc:Choice Requires="a14">
           <p:sp>
             <p:nvSpPr>
               <p:cNvPr id="70" name="TextBox 69">
@@ -3935,7 +3936,7 @@
             </p:txBody>
           </p:sp>
         </mc:Choice>
-        <mc:Fallback>
+        <mc:Fallback xmlns="">
           <p:sp>
             <p:nvSpPr>
               <p:cNvPr id="70" name="TextBox 69">
@@ -9190,6 +9191,288 @@
 </p:sld>
 </file>
 
+<file path=ppt/slides/slide2.xml><?xml version="1.0" encoding="utf-8"?>
+<p:sld xmlns:a="http://schemas.openxmlformats.org/drawingml/2006/main" xmlns:r="http://schemas.openxmlformats.org/officeDocument/2006/relationships" xmlns:p="http://schemas.openxmlformats.org/presentationml/2006/main">
+  <p:cSld>
+    <p:bg>
+      <p:bgPr>
+        <a:solidFill>
+          <a:schemeClr val="bg1"/>
+        </a:solidFill>
+        <a:effectLst/>
+      </p:bgPr>
+    </p:bg>
+    <p:spTree>
+      <p:nvGrpSpPr>
+        <p:cNvPr id="1" name=""/>
+        <p:cNvGrpSpPr/>
+        <p:nvPr/>
+      </p:nvGrpSpPr>
+      <p:grpSpPr>
+        <a:xfrm>
+          <a:off x="0" y="0"/>
+          <a:ext cx="0" cy="0"/>
+          <a:chOff x="0" y="0"/>
+          <a:chExt cx="0" cy="0"/>
+        </a:xfrm>
+      </p:grpSpPr>
+      <p:sp>
+        <p:nvSpPr>
+          <p:cNvPr id="24" name="Rectangle 23">
+            <a:extLst>
+              <a:ext uri="{FF2B5EF4-FFF2-40B4-BE49-F238E27FC236}">
+                <a16:creationId xmlns:a16="http://schemas.microsoft.com/office/drawing/2014/main" id="{42A4FC2C-047E-45A5-965D-8E1E3BF09BC6}"/>
+              </a:ext>
+              <a:ext uri="{C183D7F6-B498-43B3-948B-1728B52AA6E4}">
+                <adec:decorative xmlns:adec="http://schemas.microsoft.com/office/drawing/2017/decorative" val="1"/>
+              </a:ext>
+            </a:extLst>
+          </p:cNvPr>
+          <p:cNvSpPr>
+            <a:spLocks noGrp="1" noRot="1" noChangeAspect="1" noMove="1" noResize="1" noEditPoints="1" noAdjustHandles="1" noChangeArrowheads="1" noChangeShapeType="1" noTextEdit="1"/>
+          </p:cNvSpPr>
+          <p:nvPr>
+            <p:extLst>
+              <p:ext uri="{386F3935-93C4-4BCD-93E2-E3B085C9AB24}">
+                <p16:designElem xmlns:p16="http://schemas.microsoft.com/office/powerpoint/2015/main" val="1"/>
+              </p:ext>
+            </p:extLst>
+          </p:nvPr>
+        </p:nvSpPr>
+        <p:spPr bwMode="white">
+          <a:xfrm>
+            <a:off x="1524" y="0"/>
+            <a:ext cx="12188952" cy="6858000"/>
+          </a:xfrm>
+          <a:prstGeom prst="rect">
+            <a:avLst/>
+          </a:prstGeom>
+          <a:noFill/>
+          <a:ln>
+            <a:noFill/>
+          </a:ln>
+        </p:spPr>
+        <p:style>
+          <a:lnRef idx="2">
+            <a:schemeClr val="accent1">
+              <a:shade val="50000"/>
+            </a:schemeClr>
+          </a:lnRef>
+          <a:fillRef idx="1">
+            <a:schemeClr val="accent1"/>
+          </a:fillRef>
+          <a:effectRef idx="0">
+            <a:schemeClr val="accent1"/>
+          </a:effectRef>
+          <a:fontRef idx="minor">
+            <a:schemeClr val="lt1"/>
+          </a:fontRef>
+        </p:style>
+        <p:txBody>
+          <a:bodyPr rtlCol="0" anchor="ctr"/>
+          <a:lstStyle>
+            <a:defPPr>
+              <a:defRPr lang="en-US"/>
+            </a:defPPr>
+            <a:lvl1pPr marL="0" algn="l" defTabSz="914400" rtl="0" eaLnBrk="1" latinLnBrk="0" hangingPunct="1">
+              <a:defRPr sz="1800" kern="1200">
+                <a:solidFill>
+                  <a:schemeClr val="lt1"/>
+                </a:solidFill>
+                <a:latin typeface="+mn-lt"/>
+                <a:ea typeface="+mn-ea"/>
+                <a:cs typeface="+mn-cs"/>
+              </a:defRPr>
+            </a:lvl1pPr>
+            <a:lvl2pPr marL="457200" algn="l" defTabSz="914400" rtl="0" eaLnBrk="1" latinLnBrk="0" hangingPunct="1">
+              <a:defRPr sz="1800" kern="1200">
+                <a:solidFill>
+                  <a:schemeClr val="lt1"/>
+                </a:solidFill>
+                <a:latin typeface="+mn-lt"/>
+                <a:ea typeface="+mn-ea"/>
+                <a:cs typeface="+mn-cs"/>
+              </a:defRPr>
+            </a:lvl2pPr>
+            <a:lvl3pPr marL="914400" algn="l" defTabSz="914400" rtl="0" eaLnBrk="1" latinLnBrk="0" hangingPunct="1">
+              <a:defRPr sz="1800" kern="1200">
+                <a:solidFill>
+                  <a:schemeClr val="lt1"/>
+                </a:solidFill>
+                <a:latin typeface="+mn-lt"/>
+                <a:ea typeface="+mn-ea"/>
+                <a:cs typeface="+mn-cs"/>
+              </a:defRPr>
+            </a:lvl3pPr>
+            <a:lvl4pPr marL="1371600" algn="l" defTabSz="914400" rtl="0" eaLnBrk="1" latinLnBrk="0" hangingPunct="1">
+              <a:defRPr sz="1800" kern="1200">
+                <a:solidFill>
+                  <a:schemeClr val="lt1"/>
+                </a:solidFill>
+                <a:latin typeface="+mn-lt"/>
+                <a:ea typeface="+mn-ea"/>
+                <a:cs typeface="+mn-cs"/>
+              </a:defRPr>
+            </a:lvl4pPr>
+            <a:lvl5pPr marL="1828800" algn="l" defTabSz="914400" rtl="0" eaLnBrk="1" latinLnBrk="0" hangingPunct="1">
+              <a:defRPr sz="1800" kern="1200">
+                <a:solidFill>
+                  <a:schemeClr val="lt1"/>
+                </a:solidFill>
+                <a:latin typeface="+mn-lt"/>
+                <a:ea typeface="+mn-ea"/>
+                <a:cs typeface="+mn-cs"/>
+              </a:defRPr>
+            </a:lvl5pPr>
+            <a:lvl6pPr marL="2286000" algn="l" defTabSz="914400" rtl="0" eaLnBrk="1" latinLnBrk="0" hangingPunct="1">
+              <a:defRPr sz="1800" kern="1200">
+                <a:solidFill>
+                  <a:schemeClr val="lt1"/>
+                </a:solidFill>
+                <a:latin typeface="+mn-lt"/>
+                <a:ea typeface="+mn-ea"/>
+                <a:cs typeface="+mn-cs"/>
+              </a:defRPr>
+            </a:lvl6pPr>
+            <a:lvl7pPr marL="2743200" algn="l" defTabSz="914400" rtl="0" eaLnBrk="1" latinLnBrk="0" hangingPunct="1">
+              <a:defRPr sz="1800" kern="1200">
+                <a:solidFill>
+                  <a:schemeClr val="lt1"/>
+                </a:solidFill>
+                <a:latin typeface="+mn-lt"/>
+                <a:ea typeface="+mn-ea"/>
+                <a:cs typeface="+mn-cs"/>
+              </a:defRPr>
+            </a:lvl7pPr>
+            <a:lvl8pPr marL="3200400" algn="l" defTabSz="914400" rtl="0" eaLnBrk="1" latinLnBrk="0" hangingPunct="1">
+              <a:defRPr sz="1800" kern="1200">
+                <a:solidFill>
+                  <a:schemeClr val="lt1"/>
+                </a:solidFill>
+                <a:latin typeface="+mn-lt"/>
+                <a:ea typeface="+mn-ea"/>
+                <a:cs typeface="+mn-cs"/>
+              </a:defRPr>
+            </a:lvl8pPr>
+            <a:lvl9pPr marL="3657600" algn="l" defTabSz="914400" rtl="0" eaLnBrk="1" latinLnBrk="0" hangingPunct="1">
+              <a:defRPr sz="1800" kern="1200">
+                <a:solidFill>
+                  <a:schemeClr val="lt1"/>
+                </a:solidFill>
+                <a:latin typeface="+mn-lt"/>
+                <a:ea typeface="+mn-ea"/>
+                <a:cs typeface="+mn-cs"/>
+              </a:defRPr>
+            </a:lvl9pPr>
+          </a:lstStyle>
+          <a:p>
+            <a:pPr algn="ctr"/>
+            <a:endParaRPr lang="en-US"/>
+          </a:p>
+        </p:txBody>
+      </p:sp>
+      <p:pic>
+        <p:nvPicPr>
+          <p:cNvPr id="19" name="Picture 18" descr="A picture containing text, diagram, screenshot, font&#10;&#10;Description automatically generated">
+            <a:extLst>
+              <a:ext uri="{FF2B5EF4-FFF2-40B4-BE49-F238E27FC236}">
+                <a16:creationId xmlns:a16="http://schemas.microsoft.com/office/drawing/2014/main" id="{63EE4C45-35BB-D089-1727-CEB9D90E90E0}"/>
+              </a:ext>
+            </a:extLst>
+          </p:cNvPr>
+          <p:cNvPicPr>
+            <a:picLocks noChangeAspect="1"/>
+          </p:cNvPicPr>
+          <p:nvPr/>
+        </p:nvPicPr>
+        <p:blipFill rotWithShape="1">
+          <a:blip r:embed="rId2"/>
+          <a:srcRect r="425" b="-1"/>
+          <a:stretch/>
+        </p:blipFill>
+        <p:spPr>
+          <a:xfrm>
+            <a:off x="20" y="1282"/>
+            <a:ext cx="12191980" cy="6856718"/>
+          </a:xfrm>
+          <a:prstGeom prst="rect">
+            <a:avLst/>
+          </a:prstGeom>
+        </p:spPr>
+      </p:pic>
+      <p:pic>
+        <p:nvPicPr>
+          <p:cNvPr id="21" name="Picture 20">
+            <a:extLst>
+              <a:ext uri="{FF2B5EF4-FFF2-40B4-BE49-F238E27FC236}">
+                <a16:creationId xmlns:a16="http://schemas.microsoft.com/office/drawing/2014/main" id="{81C8BA97-9830-407F-2831-09D3923A03A8}"/>
+              </a:ext>
+            </a:extLst>
+          </p:cNvPr>
+          <p:cNvPicPr>
+            <a:picLocks noChangeAspect="1"/>
+          </p:cNvPicPr>
+          <p:nvPr/>
+        </p:nvPicPr>
+        <p:blipFill>
+          <a:blip r:embed="rId3"/>
+          <a:stretch>
+            <a:fillRect/>
+          </a:stretch>
+        </p:blipFill>
+        <p:spPr>
+          <a:xfrm>
+            <a:off x="4733290" y="2626360"/>
+            <a:ext cx="4432300" cy="508000"/>
+          </a:xfrm>
+          <a:prstGeom prst="rect">
+            <a:avLst/>
+          </a:prstGeom>
+        </p:spPr>
+      </p:pic>
+      <p:pic>
+        <p:nvPicPr>
+          <p:cNvPr id="23" name="Picture 22">
+            <a:extLst>
+              <a:ext uri="{FF2B5EF4-FFF2-40B4-BE49-F238E27FC236}">
+                <a16:creationId xmlns:a16="http://schemas.microsoft.com/office/drawing/2014/main" id="{CE0C4112-BD64-A9F7-2F4C-23068BF4D730}"/>
+              </a:ext>
+            </a:extLst>
+          </p:cNvPr>
+          <p:cNvPicPr>
+            <a:picLocks noChangeAspect="1"/>
+          </p:cNvPicPr>
+          <p:nvPr/>
+        </p:nvPicPr>
+        <p:blipFill>
+          <a:blip r:embed="rId4"/>
+          <a:stretch>
+            <a:fillRect/>
+          </a:stretch>
+        </p:blipFill>
+        <p:spPr>
+          <a:xfrm>
+            <a:off x="648970" y="1076914"/>
+            <a:ext cx="7772400" cy="473815"/>
+          </a:xfrm>
+          <a:prstGeom prst="rect">
+            <a:avLst/>
+          </a:prstGeom>
+        </p:spPr>
+      </p:pic>
+    </p:spTree>
+    <p:extLst>
+      <p:ext uri="{BB962C8B-B14F-4D97-AF65-F5344CB8AC3E}">
+        <p14:creationId xmlns:p14="http://schemas.microsoft.com/office/powerpoint/2010/main" val="4255944441"/>
+      </p:ext>
+    </p:extLst>
+  </p:cSld>
+  <p:clrMapOvr>
+    <a:masterClrMapping/>
+  </p:clrMapOvr>
+</p:sld>
+</file>
+
 <file path=ppt/theme/theme1.xml><?xml version="1.0" encoding="utf-8"?>
 <a:theme xmlns:a="http://schemas.openxmlformats.org/drawingml/2006/main" name="Office Theme">
   <a:themeElements>

</xml_diff>